<commit_message>
Updated Somya's presentation to include AppCode 25% code.
</commit_message>
<xml_diff>
--- a/Somya_Jain_AppCode.pptx
+++ b/Somya_Jain_AppCode.pptx
@@ -8,8 +8,8 @@
     <p:sldId id="256" r:id="rId2"/>
     <p:sldId id="257" r:id="rId3"/>
     <p:sldId id="262" r:id="rId4"/>
-    <p:sldId id="258" r:id="rId5"/>
-    <p:sldId id="259" r:id="rId6"/>
+    <p:sldId id="259" r:id="rId5"/>
+    <p:sldId id="258" r:id="rId6"/>
     <p:sldId id="261" r:id="rId7"/>
   </p:sldIdLst>
   <p:sldSz cx="9144000" cy="6858000" type="screen4x3"/>
@@ -3259,17 +3259,21 @@
           <a:p>
             <a:pPr lvl="1"/>
             <a:r>
-              <a:rPr lang="en-US" smtClean="0"/>
+              <a:rPr lang="en-US" dirty="0" smtClean="0"/>
               <a:t>Refactoring</a:t>
             </a:r>
+          </a:p>
+          <a:p>
+            <a:pPr lvl="1"/>
+            <a:r>
+              <a:rPr lang="en-US" dirty="0" smtClean="0"/>
+              <a:t>Code </a:t>
+            </a:r>
+            <a:r>
+              <a:rPr lang="en-US" dirty="0" smtClean="0"/>
+              <a:t>formatting</a:t>
+            </a:r>
             <a:endParaRPr lang="en-US" dirty="0" smtClean="0"/>
-          </a:p>
-          <a:p>
-            <a:pPr lvl="1"/>
-            <a:r>
-              <a:rPr lang="en-US" dirty="0" smtClean="0"/>
-              <a:t>Code style</a:t>
-            </a:r>
           </a:p>
           <a:p>
             <a:r>
@@ -3346,25 +3350,6 @@
           </a:p>
         </p:txBody>
       </p:sp>
-      <p:sp>
-        <p:nvSpPr>
-          <p:cNvPr id="3" name="Subtitle 2"/>
-          <p:cNvSpPr>
-            <a:spLocks noGrp="1"/>
-          </p:cNvSpPr>
-          <p:nvPr>
-            <p:ph type="subTitle" idx="1"/>
-          </p:nvPr>
-        </p:nvSpPr>
-        <p:spPr/>
-        <p:txBody>
-          <a:bodyPr/>
-          <a:lstStyle/>
-          <a:p>
-            <a:endParaRPr lang="en-US"/>
-          </a:p>
-        </p:txBody>
-      </p:sp>
     </p:spTree>
     <p:extLst>
       <p:ext uri="{BB962C8B-B14F-4D97-AF65-F5344CB8AC3E}">
@@ -3375,6 +3360,13 @@
   <p:clrMapOvr>
     <a:masterClrMapping/>
   </p:clrMapOvr>
+  <p:timing>
+    <p:tnLst>
+      <p:par>
+        <p:cTn xmlns:p14="http://schemas.microsoft.com/office/powerpoint/2010/main" id="1" dur="indefinite" restart="never" nodeType="tmRoot"/>
+      </p:par>
+    </p:tnLst>
+  </p:timing>
 </p:sld>
 </file>
 
@@ -3412,117 +3404,6 @@
           <a:p>
             <a:r>
               <a:rPr lang="en-US" dirty="0" smtClean="0"/>
-              <a:t>Cons</a:t>
-            </a:r>
-            <a:endParaRPr lang="en-US" dirty="0"/>
-          </a:p>
-        </p:txBody>
-      </p:sp>
-      <p:sp>
-        <p:nvSpPr>
-          <p:cNvPr id="3" name="Content Placeholder 2"/>
-          <p:cNvSpPr>
-            <a:spLocks noGrp="1"/>
-          </p:cNvSpPr>
-          <p:nvPr>
-            <p:ph idx="1"/>
-          </p:nvPr>
-        </p:nvSpPr>
-        <p:spPr/>
-        <p:txBody>
-          <a:bodyPr/>
-          <a:lstStyle/>
-          <a:p>
-            <a:r>
-              <a:rPr lang="en-US" dirty="0" smtClean="0"/>
-              <a:t>Most project setup needs to be done in </a:t>
-            </a:r>
-            <a:r>
-              <a:rPr lang="en-US" dirty="0" err="1" smtClean="0"/>
-              <a:t>Xcode</a:t>
-            </a:r>
-            <a:r>
-              <a:rPr lang="en-US" dirty="0" smtClean="0"/>
-              <a:t>. E.g. certs, targets.</a:t>
-            </a:r>
-          </a:p>
-          <a:p>
-            <a:r>
-              <a:rPr lang="en-US" dirty="0" smtClean="0"/>
-              <a:t>Reloads the project when something changes in the Project file.</a:t>
-            </a:r>
-          </a:p>
-          <a:p>
-            <a:r>
-              <a:rPr lang="en-US" dirty="0" err="1" smtClean="0"/>
-              <a:t>Xib</a:t>
-            </a:r>
-            <a:r>
-              <a:rPr lang="en-US" dirty="0" smtClean="0"/>
-              <a:t> Editor is still </a:t>
-            </a:r>
-            <a:r>
-              <a:rPr lang="en-US" dirty="0" err="1" smtClean="0"/>
-              <a:t>XCode</a:t>
-            </a:r>
-            <a:endParaRPr lang="en-US" dirty="0" smtClean="0"/>
-          </a:p>
-        </p:txBody>
-      </p:sp>
-    </p:spTree>
-    <p:extLst>
-      <p:ext uri="{BB962C8B-B14F-4D97-AF65-F5344CB8AC3E}">
-        <p14:creationId xmlns:p14="http://schemas.microsoft.com/office/powerpoint/2010/main" val="1849252005"/>
-      </p:ext>
-    </p:extLst>
-  </p:cSld>
-  <p:clrMapOvr>
-    <a:masterClrMapping/>
-  </p:clrMapOvr>
-  <p:timing>
-    <p:tnLst>
-      <p:par>
-        <p:cTn xmlns:p14="http://schemas.microsoft.com/office/powerpoint/2010/main" id="1" dur="indefinite" restart="never" nodeType="tmRoot"/>
-      </p:par>
-    </p:tnLst>
-  </p:timing>
-</p:sld>
-</file>
-
-<file path=ppt/slides/slide5.xml><?xml version="1.0" encoding="utf-8"?>
-<p:sld xmlns:a="http://schemas.openxmlformats.org/drawingml/2006/main" xmlns:r="http://schemas.openxmlformats.org/officeDocument/2006/relationships" xmlns:p="http://schemas.openxmlformats.org/presentationml/2006/main">
-  <p:cSld>
-    <p:spTree>
-      <p:nvGrpSpPr>
-        <p:cNvPr id="1" name=""/>
-        <p:cNvGrpSpPr/>
-        <p:nvPr/>
-      </p:nvGrpSpPr>
-      <p:grpSpPr>
-        <a:xfrm>
-          <a:off x="0" y="0"/>
-          <a:ext cx="0" cy="0"/>
-          <a:chOff x="0" y="0"/>
-          <a:chExt cx="0" cy="0"/>
-        </a:xfrm>
-      </p:grpSpPr>
-      <p:sp>
-        <p:nvSpPr>
-          <p:cNvPr id="2" name="Title 1"/>
-          <p:cNvSpPr>
-            <a:spLocks noGrp="1"/>
-          </p:cNvSpPr>
-          <p:nvPr>
-            <p:ph type="title"/>
-          </p:nvPr>
-        </p:nvSpPr>
-        <p:spPr/>
-        <p:txBody>
-          <a:bodyPr/>
-          <a:lstStyle/>
-          <a:p>
-            <a:r>
-              <a:rPr lang="en-US" dirty="0" smtClean="0"/>
               <a:t>Other Features</a:t>
             </a:r>
             <a:endParaRPr lang="en-US" dirty="0"/>
@@ -3542,12 +3423,12 @@
         <p:spPr>
           <a:xfrm>
             <a:off x="457200" y="1600200"/>
-            <a:ext cx="8229600" cy="1507021"/>
+            <a:ext cx="8229600" cy="2146300"/>
           </a:xfrm>
         </p:spPr>
         <p:txBody>
           <a:bodyPr>
-            <a:normAutofit fontScale="70000" lnSpcReduction="20000"/>
+            <a:normAutofit fontScale="92500" lnSpcReduction="10000"/>
           </a:bodyPr>
           <a:lstStyle/>
           <a:p>
@@ -3559,20 +3440,38 @@
           <a:p>
             <a:r>
               <a:rPr lang="en-US" dirty="0" smtClean="0"/>
-              <a:t>Unit Tests</a:t>
-            </a:r>
-          </a:p>
-          <a:p>
+              <a:t>Unit </a:t>
+            </a:r>
             <a:r>
               <a:rPr lang="en-US" dirty="0" smtClean="0"/>
-              <a:t>Call / Object Hierarchy Viewer</a:t>
-            </a:r>
+              <a:t>Tests</a:t>
+            </a:r>
+          </a:p>
+          <a:p>
+            <a:r>
+              <a:rPr lang="en-US" dirty="0" smtClean="0"/>
+              <a:t>Version Control support including </a:t>
+            </a:r>
+            <a:r>
+              <a:rPr lang="en-US" dirty="0" err="1" smtClean="0"/>
+              <a:t>Git</a:t>
+            </a:r>
+            <a:r>
+              <a:rPr lang="en-US" dirty="0" smtClean="0"/>
+              <a:t>, SVN </a:t>
+            </a:r>
+            <a:r>
+              <a:rPr lang="en-US" dirty="0" err="1" smtClean="0"/>
+              <a:t>etc</a:t>
+            </a:r>
+            <a:endParaRPr lang="en-US" dirty="0" smtClean="0"/>
           </a:p>
           <a:p>
             <a:r>
               <a:rPr lang="en-US" dirty="0" smtClean="0"/>
               <a:t>Debugger</a:t>
             </a:r>
+            <a:endParaRPr lang="en-US" dirty="0" smtClean="0"/>
           </a:p>
           <a:p>
             <a:endParaRPr lang="en-US" dirty="0"/>
@@ -3820,6 +3719,137 @@
 </p:sld>
 </file>
 
+<file path=ppt/slides/slide5.xml><?xml version="1.0" encoding="utf-8"?>
+<p:sld xmlns:a="http://schemas.openxmlformats.org/drawingml/2006/main" xmlns:r="http://schemas.openxmlformats.org/officeDocument/2006/relationships" xmlns:p="http://schemas.openxmlformats.org/presentationml/2006/main">
+  <p:cSld>
+    <p:spTree>
+      <p:nvGrpSpPr>
+        <p:cNvPr id="1" name=""/>
+        <p:cNvGrpSpPr/>
+        <p:nvPr/>
+      </p:nvGrpSpPr>
+      <p:grpSpPr>
+        <a:xfrm>
+          <a:off x="0" y="0"/>
+          <a:ext cx="0" cy="0"/>
+          <a:chOff x="0" y="0"/>
+          <a:chExt cx="0" cy="0"/>
+        </a:xfrm>
+      </p:grpSpPr>
+      <p:sp>
+        <p:nvSpPr>
+          <p:cNvPr id="2" name="Title 1"/>
+          <p:cNvSpPr>
+            <a:spLocks noGrp="1"/>
+          </p:cNvSpPr>
+          <p:nvPr>
+            <p:ph type="title"/>
+          </p:nvPr>
+        </p:nvSpPr>
+        <p:spPr/>
+        <p:txBody>
+          <a:bodyPr/>
+          <a:lstStyle/>
+          <a:p>
+            <a:r>
+              <a:rPr lang="en-US" dirty="0" smtClean="0"/>
+              <a:t>Cons</a:t>
+            </a:r>
+            <a:endParaRPr lang="en-US" dirty="0"/>
+          </a:p>
+        </p:txBody>
+      </p:sp>
+      <p:sp>
+        <p:nvSpPr>
+          <p:cNvPr id="3" name="Content Placeholder 2"/>
+          <p:cNvSpPr>
+            <a:spLocks noGrp="1"/>
+          </p:cNvSpPr>
+          <p:nvPr>
+            <p:ph idx="1"/>
+          </p:nvPr>
+        </p:nvSpPr>
+        <p:spPr/>
+        <p:txBody>
+          <a:bodyPr/>
+          <a:lstStyle/>
+          <a:p>
+            <a:r>
+              <a:rPr lang="en-US" dirty="0" smtClean="0"/>
+              <a:t>Most project setup needs to be done in </a:t>
+            </a:r>
+            <a:r>
+              <a:rPr lang="en-US" dirty="0" err="1" smtClean="0"/>
+              <a:t>Xcode</a:t>
+            </a:r>
+            <a:r>
+              <a:rPr lang="en-US" dirty="0" smtClean="0"/>
+              <a:t>. E.g. certs, targets.</a:t>
+            </a:r>
+          </a:p>
+          <a:p>
+            <a:r>
+              <a:rPr lang="en-US" dirty="0" smtClean="0"/>
+              <a:t>Reloads the project when something changes in the </a:t>
+            </a:r>
+            <a:r>
+              <a:rPr lang="en-US" dirty="0" smtClean="0"/>
+              <a:t>project </a:t>
+            </a:r>
+            <a:r>
+              <a:rPr lang="en-US" dirty="0" smtClean="0"/>
+              <a:t>file.</a:t>
+            </a:r>
+          </a:p>
+          <a:p>
+            <a:r>
+              <a:rPr lang="en-US" dirty="0" err="1" smtClean="0"/>
+              <a:t>Xib</a:t>
+            </a:r>
+            <a:r>
+              <a:rPr lang="en-US" dirty="0" smtClean="0"/>
+              <a:t>/</a:t>
+            </a:r>
+            <a:r>
+              <a:rPr lang="en-US" dirty="0" err="1" smtClean="0"/>
+              <a:t>CoreData</a:t>
+            </a:r>
+            <a:r>
+              <a:rPr lang="en-US" dirty="0" smtClean="0"/>
+              <a:t> </a:t>
+            </a:r>
+            <a:r>
+              <a:rPr lang="en-US" dirty="0" smtClean="0"/>
+              <a:t>Editor is </a:t>
+            </a:r>
+            <a:r>
+              <a:rPr lang="en-US" dirty="0" err="1" smtClean="0"/>
+              <a:t>XCode</a:t>
+            </a:r>
+            <a:endParaRPr lang="en-US" dirty="0" smtClean="0"/>
+          </a:p>
+        </p:txBody>
+      </p:sp>
+    </p:spTree>
+    <p:extLst>
+      <p:ext uri="{BB962C8B-B14F-4D97-AF65-F5344CB8AC3E}">
+        <p14:creationId xmlns:p14="http://schemas.microsoft.com/office/powerpoint/2010/main" val="1849252005"/>
+      </p:ext>
+    </p:extLst>
+  </p:cSld>
+  <p:clrMapOvr>
+    <a:masterClrMapping/>
+  </p:clrMapOvr>
+  <p:timing>
+    <p:tnLst>
+      <p:par>
+        <p:cTn xmlns:p14="http://schemas.microsoft.com/office/powerpoint/2010/main" id="1" dur="indefinite" restart="never" nodeType="tmRoot"/>
+      </p:par>
+    </p:tnLst>
+  </p:timing>
+</p:sld>
+</file>
+
 <file path=ppt/slides/slide6.xml><?xml version="1.0" encoding="utf-8"?>
 <p:sld xmlns:a="http://schemas.openxmlformats.org/drawingml/2006/main" xmlns:r="http://schemas.openxmlformats.org/officeDocument/2006/relationships" xmlns:p="http://schemas.openxmlformats.org/presentationml/2006/main">
   <p:cSld>
@@ -3882,14 +3912,45 @@
           </a:xfrm>
         </p:spPr>
         <p:txBody>
-          <a:bodyPr/>
+          <a:bodyPr>
+            <a:normAutofit fontScale="92500" lnSpcReduction="10000"/>
+          </a:bodyPr>
           <a:lstStyle/>
           <a:p>
             <a:r>
               <a:rPr lang="pl-PL" dirty="0" smtClean="0">
                 <a:hlinkClick r:id="rId2"/>
               </a:rPr>
-              <a:t>www.jetbrains.com/objc/</a:t>
+              <a:t>www.jetbrains.com/objc</a:t>
+            </a:r>
+            <a:r>
+              <a:rPr lang="pl-PL" dirty="0" smtClean="0">
+                <a:hlinkClick r:id="rId2"/>
+              </a:rPr>
+              <a:t>/</a:t>
+            </a:r>
+            <a:endParaRPr lang="pl-PL" dirty="0"/>
+          </a:p>
+          <a:p>
+            <a:r>
+              <a:rPr lang="pl-PL" dirty="0" smtClean="0"/>
+              <a:t>Price $99 (don’t quote </a:t>
+            </a:r>
+            <a:r>
+              <a:rPr lang="pl-PL" smtClean="0"/>
+              <a:t>me). </a:t>
+            </a:r>
+            <a:r>
+              <a:rPr lang="pl-PL" dirty="0" smtClean="0"/>
+              <a:t>25% off with coupon code </a:t>
+            </a:r>
+            <a:r>
+              <a:rPr lang="en-US" dirty="0"/>
+              <a:t>SFU85-WKS63-DQLZT-H2JR0-QUJ41</a:t>
+            </a:r>
+            <a:r>
+              <a:rPr lang="pl-PL" dirty="0" smtClean="0"/>
+              <a:t>.</a:t>
             </a:r>
             <a:endParaRPr lang="pl-PL" dirty="0" smtClean="0"/>
           </a:p>
@@ -3912,13 +3973,28 @@
           </a:xfrm>
         </p:spPr>
         <p:txBody>
-          <a:bodyPr/>
+          <a:bodyPr>
+            <a:normAutofit fontScale="92500" lnSpcReduction="10000"/>
+          </a:bodyPr>
           <a:lstStyle/>
           <a:p>
             <a:r>
               <a:rPr lang="en-US" dirty="0" smtClean="0"/>
-              <a:t>Freelance Mobile Developer</a:t>
-            </a:r>
+              <a:t>Freelance Mobile </a:t>
+            </a:r>
+            <a:r>
+              <a:rPr lang="en-US" dirty="0" smtClean="0"/>
+              <a:t>Developer (</a:t>
+            </a:r>
+            <a:r>
+              <a:rPr lang="en-US" dirty="0" err="1" smtClean="0"/>
+              <a:t>iOS</a:t>
+            </a:r>
+            <a:r>
+              <a:rPr lang="en-US" dirty="0" smtClean="0"/>
+              <a:t>, Android &amp; WP7)</a:t>
+            </a:r>
+            <a:endParaRPr lang="en-US" dirty="0" smtClean="0"/>
           </a:p>
           <a:p>
             <a:r>

</xml_diff>